<commit_message>
Adicionando novo slide da infra
</commit_message>
<xml_diff>
--- a/documentation/Infraestrutura do Connect.pptx
+++ b/documentation/Infraestrutura do Connect.pptx
@@ -5,13 +5,14 @@
     <p:sldMasterId id="2147483648" r:id="rId1"/>
   </p:sldMasterIdLst>
   <p:notesMasterIdLst>
-    <p:notesMasterId r:id="rId4"/>
+    <p:notesMasterId r:id="rId5"/>
   </p:notesMasterIdLst>
   <p:handoutMasterIdLst>
-    <p:handoutMasterId r:id="rId5"/>
+    <p:handoutMasterId r:id="rId6"/>
   </p:handoutMasterIdLst>
   <p:sldIdLst>
     <p:sldId id="256" r:id="rId3"/>
+    <p:sldId id="257" r:id="rId4"/>
   </p:sldIdLst>
   <p:sldSz cx="12192000" cy="6858000"/>
   <p:notesSz cx="7103745" cy="10234295"/>
@@ -4160,6 +4161,295 @@
           </a:fontRef>
         </p:style>
       </p:cxnSp>
+    </p:spTree>
+  </p:cSld>
+  <p:clrMapOvr>
+    <a:masterClrMapping/>
+  </p:clrMapOvr>
+</p:sld>
+</file>
+
+<file path=ppt/slides/slide2.xml><?xml version="1.0" encoding="utf-8"?>
+<p:sld xmlns:a="http://schemas.openxmlformats.org/drawingml/2006/main" xmlns:r="http://schemas.openxmlformats.org/officeDocument/2006/relationships" xmlns:p="http://schemas.openxmlformats.org/presentationml/2006/main">
+  <p:cSld>
+    <p:spTree>
+      <p:nvGrpSpPr>
+        <p:cNvPr id="1" name=""/>
+        <p:cNvGrpSpPr/>
+        <p:nvPr/>
+      </p:nvGrpSpPr>
+      <p:grpSpPr/>
+      <p:sp>
+        <p:nvSpPr>
+          <p:cNvPr id="4" name="Caixa de Texto 3"/>
+          <p:cNvSpPr txBox="1"/>
+          <p:nvPr/>
+        </p:nvSpPr>
+        <p:spPr>
+          <a:xfrm>
+            <a:off x="-635" y="290195"/>
+            <a:ext cx="12193270" cy="480695"/>
+          </a:xfrm>
+          <a:prstGeom prst="rect">
+            <a:avLst/>
+          </a:prstGeom>
+          <a:noFill/>
+        </p:spPr>
+        <p:txBody>
+          <a:bodyPr wrap="square" rtlCol="0">
+            <a:noAutofit/>
+          </a:bodyPr>
+          <a:p>
+            <a:pPr algn="ctr"/>
+            <a:r>
+              <a:rPr lang="en-US" altLang="pt-BR" sz="2500"/>
+              <a:t>Credenciais utilizadas no connect</a:t>
+            </a:r>
+            <a:endParaRPr lang="en-US" altLang="pt-BR" sz="2500"/>
+          </a:p>
+        </p:txBody>
+      </p:sp>
+      <p:sp>
+        <p:nvSpPr>
+          <p:cNvPr id="5" name="Caixa de Texto 4"/>
+          <p:cNvSpPr txBox="1"/>
+          <p:nvPr/>
+        </p:nvSpPr>
+        <p:spPr>
+          <a:xfrm>
+            <a:off x="0" y="1097915"/>
+            <a:ext cx="12192635" cy="5760720"/>
+          </a:xfrm>
+          <a:prstGeom prst="rect">
+            <a:avLst/>
+          </a:prstGeom>
+          <a:noFill/>
+        </p:spPr>
+        <p:txBody>
+          <a:bodyPr wrap="square" rtlCol="0" anchor="t">
+            <a:noAutofit/>
+          </a:bodyPr>
+          <a:p>
+            <a:pPr marL="1200150" lvl="2" indent="-285750">
+              <a:buFont typeface="Arial" panose="020B0604020202020204" pitchFamily="34" charset="0"/>
+              <a:buChar char="•"/>
+            </a:pPr>
+            <a:r>
+              <a:rPr lang="en-US" altLang="pt-BR"/>
+              <a:t>Credenciais da API(https://ws1.soc.com.br/WSSoc/services/ExportaDadosWs)</a:t>
+            </a:r>
+            <a:endParaRPr lang="en-US" altLang="pt-BR"/>
+          </a:p>
+          <a:p>
+            <a:pPr marL="1657350" lvl="3" indent="-285750">
+              <a:buFont typeface="Arial" panose="020B0604020202020204" pitchFamily="34" charset="0"/>
+              <a:buChar char="•"/>
+            </a:pPr>
+            <a:r>
+              <a:rPr lang="pt-BR" altLang="en-US">
+                <a:sym typeface="+mn-ea"/>
+              </a:rPr>
+              <a:t>keys/soc/exporta_dados</a:t>
+            </a:r>
+            <a:endParaRPr lang="pt-BR" altLang="en-US">
+              <a:sym typeface="+mn-ea"/>
+            </a:endParaRPr>
+          </a:p>
+          <a:p>
+            <a:pPr marL="1657350" lvl="3" indent="-285750">
+              <a:buFont typeface="Arial" panose="020B0604020202020204" pitchFamily="34" charset="0"/>
+              <a:buChar char="•"/>
+            </a:pPr>
+            <a:r>
+              <a:rPr lang="en-US" altLang="pt-BR">
+                <a:sym typeface="+mn-ea"/>
+              </a:rPr>
+              <a:t>Exemplo de BODY</a:t>
+            </a:r>
+            <a:endParaRPr lang="en-US" altLang="pt-BR">
+              <a:sym typeface="+mn-ea"/>
+            </a:endParaRPr>
+          </a:p>
+          <a:p>
+            <a:pPr marL="2114550" lvl="4" indent="-285750">
+              <a:buFont typeface="Arial" panose="020B0604020202020204" pitchFamily="34" charset="0"/>
+              <a:buChar char="•"/>
+            </a:pPr>
+            <a:r>
+              <a:rPr lang="en-US" altLang="pt-BR"/>
+              <a:t>&lt;soapenv:Envelope xmlns:soapenv="http://schemas.xmlsoap.org/soap/envelope/"</a:t>
+            </a:r>
+            <a:endParaRPr lang="en-US" altLang="pt-BR"/>
+          </a:p>
+          <a:p>
+            <a:pPr marL="2114550" lvl="4" indent="-285750">
+              <a:buFont typeface="Arial" panose="020B0604020202020204" pitchFamily="34" charset="0"/>
+              <a:buChar char="•"/>
+            </a:pPr>
+            <a:r>
+              <a:rPr lang="en-US" altLang="pt-BR"/>
+              <a:t>    xmlns:ser="http://services.soc.age.com/"&gt;</a:t>
+            </a:r>
+            <a:endParaRPr lang="en-US" altLang="pt-BR"/>
+          </a:p>
+          <a:p>
+            <a:pPr marL="2114550" lvl="4" indent="-285750">
+              <a:buFont typeface="Arial" panose="020B0604020202020204" pitchFamily="34" charset="0"/>
+              <a:buChar char="•"/>
+            </a:pPr>
+            <a:r>
+              <a:rPr lang="en-US" altLang="pt-BR"/>
+              <a:t>     &lt;soapenv:Header/&gt;</a:t>
+            </a:r>
+            <a:endParaRPr lang="en-US" altLang="pt-BR"/>
+          </a:p>
+          <a:p>
+            <a:pPr marL="2114550" lvl="4" indent="-285750">
+              <a:buFont typeface="Arial" panose="020B0604020202020204" pitchFamily="34" charset="0"/>
+              <a:buChar char="•"/>
+            </a:pPr>
+            <a:r>
+              <a:rPr lang="en-US" altLang="pt-BR"/>
+              <a:t>     &lt;soapenv:Body&gt;</a:t>
+            </a:r>
+            <a:endParaRPr lang="en-US" altLang="pt-BR"/>
+          </a:p>
+          <a:p>
+            <a:pPr marL="2114550" lvl="4" indent="-285750">
+              <a:buFont typeface="Arial" panose="020B0604020202020204" pitchFamily="34" charset="0"/>
+              <a:buChar char="•"/>
+            </a:pPr>
+            <a:r>
+              <a:rPr lang="en-US" altLang="pt-BR"/>
+              <a:t>     &lt;ser:exportaDadosWs&gt;</a:t>
+            </a:r>
+            <a:endParaRPr lang="en-US" altLang="pt-BR"/>
+          </a:p>
+          <a:p>
+            <a:pPr marL="2114550" lvl="4" indent="-285750">
+              <a:buFont typeface="Arial" panose="020B0604020202020204" pitchFamily="34" charset="0"/>
+              <a:buChar char="•"/>
+            </a:pPr>
+            <a:r>
+              <a:rPr lang="en-US" altLang="pt-BR"/>
+              <a:t>     &lt;arg0&gt;</a:t>
+            </a:r>
+            <a:endParaRPr lang="en-US" altLang="pt-BR"/>
+          </a:p>
+          <a:p>
+            <a:pPr marL="2114550" lvl="4" indent="-285750">
+              <a:buFont typeface="Arial" panose="020B0604020202020204" pitchFamily="34" charset="0"/>
+              <a:buChar char="•"/>
+            </a:pPr>
+            <a:r>
+              <a:rPr lang="en-US" altLang="pt-BR"/>
+              <a:t>     &lt;parametros&gt;{'empresa': CodigoEmpresaPrincipal, 'empresaTrabalho': </a:t>
+            </a:r>
+            <a:r>
+              <a:rPr lang="en-US" altLang="pt-BR">
+                <a:sym typeface="+mn-ea"/>
+              </a:rPr>
+              <a:t>CodigoDaUnidade</a:t>
+            </a:r>
+            <a:r>
+              <a:rPr lang="en-US" altLang="pt-BR"/>
+              <a:t>, 'codigo': 'CodigoDoRelatorio', 'chave': 'ChaveDoUsuario', 'tipoSaida': 'TipoDaSaida(Ex.: JSON)'}</a:t>
+            </a:r>
+            <a:endParaRPr lang="en-US" altLang="pt-BR"/>
+          </a:p>
+          <a:p>
+            <a:pPr marL="2114550" lvl="4" indent="-285750">
+              <a:buFont typeface="Arial" panose="020B0604020202020204" pitchFamily="34" charset="0"/>
+              <a:buChar char="•"/>
+            </a:pPr>
+            <a:r>
+              <a:rPr lang="en-US" altLang="pt-BR"/>
+              <a:t>     &lt;/parametros&gt;     </a:t>
+            </a:r>
+            <a:endParaRPr lang="en-US" altLang="pt-BR"/>
+          </a:p>
+          <a:p>
+            <a:pPr marL="2114550" lvl="4" indent="-285750">
+              <a:buFont typeface="Arial" panose="020B0604020202020204" pitchFamily="34" charset="0"/>
+              <a:buChar char="•"/>
+            </a:pPr>
+            <a:r>
+              <a:rPr lang="en-US" altLang="pt-BR"/>
+              <a:t>     &lt;/arg0&gt;</a:t>
+            </a:r>
+            <a:endParaRPr lang="en-US" altLang="pt-BR"/>
+          </a:p>
+          <a:p>
+            <a:pPr marL="2114550" lvl="4" indent="-285750">
+              <a:buFont typeface="Arial" panose="020B0604020202020204" pitchFamily="34" charset="0"/>
+              <a:buChar char="•"/>
+            </a:pPr>
+            <a:r>
+              <a:rPr lang="en-US" altLang="pt-BR"/>
+              <a:t>     &lt;/ser:exportaDadosWs&gt;</a:t>
+            </a:r>
+            <a:endParaRPr lang="en-US" altLang="pt-BR"/>
+          </a:p>
+          <a:p>
+            <a:pPr marL="2114550" lvl="4" indent="-285750">
+              <a:buFont typeface="Arial" panose="020B0604020202020204" pitchFamily="34" charset="0"/>
+              <a:buChar char="•"/>
+            </a:pPr>
+            <a:r>
+              <a:rPr lang="en-US" altLang="pt-BR"/>
+              <a:t>     &lt;/soapenv:Body&gt;</a:t>
+            </a:r>
+            <a:endParaRPr lang="en-US" altLang="pt-BR"/>
+          </a:p>
+          <a:p>
+            <a:pPr marL="2114550" lvl="4" indent="-285750">
+              <a:buFont typeface="Arial" panose="020B0604020202020204" pitchFamily="34" charset="0"/>
+              <a:buChar char="•"/>
+            </a:pPr>
+            <a:r>
+              <a:rPr lang="en-US" altLang="pt-BR"/>
+              <a:t>    &lt;/soapenv:Envelope&gt;</a:t>
+            </a:r>
+            <a:endParaRPr lang="en-US" altLang="pt-BR"/>
+          </a:p>
+          <a:p>
+            <a:pPr marL="1200150" lvl="2" indent="-285750">
+              <a:buFont typeface="Arial" panose="020B0604020202020204" pitchFamily="34" charset="0"/>
+              <a:buChar char="•"/>
+            </a:pPr>
+            <a:endParaRPr lang="en-US" altLang="pt-BR"/>
+          </a:p>
+          <a:p>
+            <a:pPr marL="1200150" lvl="2" indent="-285750">
+              <a:buFont typeface="Arial" panose="020B0604020202020204" pitchFamily="34" charset="0"/>
+              <a:buChar char="•"/>
+            </a:pPr>
+            <a:r>
+              <a:rPr lang="en-US" altLang="pt-BR"/>
+              <a:t>Credenciais WebService</a:t>
+            </a:r>
+            <a:endParaRPr lang="en-US" altLang="pt-BR"/>
+          </a:p>
+          <a:p>
+            <a:pPr marL="1657350" lvl="3" indent="-285750">
+              <a:buFont typeface="Arial" panose="020B0604020202020204" pitchFamily="34" charset="0"/>
+              <a:buChar char="•"/>
+            </a:pPr>
+            <a:r>
+              <a:rPr lang="en-US" altLang="pt-BR"/>
+              <a:t>keys/soc/web_service</a:t>
+            </a:r>
+            <a:endParaRPr lang="en-US" altLang="pt-BR"/>
+          </a:p>
+          <a:p>
+            <a:pPr marL="1200150" lvl="2" indent="-285750">
+              <a:buFont typeface="Arial" panose="020B0604020202020204" pitchFamily="34" charset="0"/>
+              <a:buChar char="•"/>
+            </a:pPr>
+            <a:endParaRPr lang="en-US" altLang="pt-BR"/>
+          </a:p>
+        </p:txBody>
+      </p:sp>
     </p:spTree>
   </p:cSld>
   <p:clrMapOvr>

</xml_diff>